<commit_message>
Added link to exercise info in ppt. Added start-up file to Matlab project. Added requirements exercise folder.
</commit_message>
<xml_diff>
--- a/2. Requirements/2.4 Requirements management in MATLAB.pptx
+++ b/2. Requirements/2.4 Requirements management in MATLAB.pptx
@@ -319,7 +319,7 @@
           <a:p>
             <a:fld id="{DE2F9ED7-D9DF-9B4A-A1AC-9FBF0C9B1C8E}" type="datetime1">
               <a:rPr lang="es-ES" smtClean="0"/>
-              <a:t>03/01/2023</a:t>
+              <a:t>24/01/2023</a:t>
             </a:fld>
             <a:endParaRPr lang="en-US"/>
           </a:p>
@@ -489,7 +489,7 @@
           <a:p>
             <a:fld id="{FEDC53B6-CB23-B545-A702-0812837A95EA}" type="datetime1">
               <a:rPr lang="es-ES" smtClean="0"/>
-              <a:t>03/01/2023</a:t>
+              <a:t>24/01/2023</a:t>
             </a:fld>
             <a:endParaRPr lang="en-US"/>
           </a:p>
@@ -1124,7 +1124,7 @@
             <a:fld id="{2D72A43D-7419-4C41-A920-C6E38643746D}" type="datetime3">
               <a:rPr lang="es-ES_tradnl" smtClean="0"/>
               <a:pPr/>
-              <a:t>03.01.23</a:t>
+              <a:t>24.01.23</a:t>
             </a:fld>
             <a:endParaRPr lang="en-US" dirty="0"/>
           </a:p>
@@ -1386,7 +1386,7 @@
             <a:fld id="{2D72A43D-7419-4C41-A920-C6E38643746D}" type="datetime3">
               <a:rPr lang="es-ES_tradnl" smtClean="0"/>
               <a:pPr/>
-              <a:t>03.01.23</a:t>
+              <a:t>24.01.23</a:t>
             </a:fld>
             <a:endParaRPr lang="en-US" dirty="0"/>
           </a:p>
@@ -1685,7 +1685,7 @@
           <a:p>
             <a:fld id="{0051B10C-2937-EF49-B2B2-FDE1E3A46A2D}" type="datetime3">
               <a:rPr lang="es-ES_tradnl" smtClean="0"/>
-              <a:t>03.01.23</a:t>
+              <a:t>24.01.23</a:t>
             </a:fld>
             <a:endParaRPr lang="en-US" dirty="0"/>
           </a:p>
@@ -1960,7 +1960,7 @@
           <a:p>
             <a:fld id="{0051B10C-2937-EF49-B2B2-FDE1E3A46A2D}" type="datetime3">
               <a:rPr lang="es-ES_tradnl" smtClean="0"/>
-              <a:t>03.01.23</a:t>
+              <a:t>24.01.23</a:t>
             </a:fld>
             <a:endParaRPr lang="en-US" dirty="0"/>
           </a:p>
@@ -2265,7 +2265,7 @@
           <a:p>
             <a:fld id="{0051B10C-2937-EF49-B2B2-FDE1E3A46A2D}" type="datetime3">
               <a:rPr lang="es-ES_tradnl" smtClean="0"/>
-              <a:t>03.01.23</a:t>
+              <a:t>24.01.23</a:t>
             </a:fld>
             <a:endParaRPr lang="en-US" dirty="0"/>
           </a:p>
@@ -2575,7 +2575,7 @@
           <a:p>
             <a:fld id="{2DCE5B6F-4229-BD47-9F49-CE071C120013}" type="datetime3">
               <a:rPr lang="es-ES_tradnl" smtClean="0"/>
-              <a:t>03.01.23</a:t>
+              <a:t>24.01.23</a:t>
             </a:fld>
             <a:endParaRPr lang="en-US" dirty="0"/>
           </a:p>
@@ -2903,7 +2903,7 @@
           <a:p>
             <a:fld id="{2DCE5B6F-4229-BD47-9F49-CE071C120013}" type="datetime3">
               <a:rPr lang="es-ES_tradnl" smtClean="0"/>
-              <a:t>03.01.23</a:t>
+              <a:t>24.01.23</a:t>
             </a:fld>
             <a:endParaRPr lang="en-US" dirty="0"/>
           </a:p>
@@ -3231,7 +3231,7 @@
           <a:p>
             <a:fld id="{2DCE5B6F-4229-BD47-9F49-CE071C120013}" type="datetime3">
               <a:rPr lang="es-ES_tradnl" smtClean="0"/>
-              <a:t>03.01.23</a:t>
+              <a:t>24.01.23</a:t>
             </a:fld>
             <a:endParaRPr lang="en-US" dirty="0"/>
           </a:p>
@@ -3669,7 +3669,7 @@
             <a:fld id="{6D8C46FE-6D60-7E43-9EAD-3064B98E9FE4}" type="datetime3">
               <a:rPr lang="es-ES_tradnl" smtClean="0"/>
               <a:pPr/>
-              <a:t>03.01.23</a:t>
+              <a:t>24.01.23</a:t>
             </a:fld>
             <a:endParaRPr lang="en-US" dirty="0"/>
           </a:p>
@@ -4092,7 +4092,7 @@
             <a:fld id="{6D8C46FE-6D60-7E43-9EAD-3064B98E9FE4}" type="datetime3">
               <a:rPr lang="es-ES_tradnl" smtClean="0"/>
               <a:pPr/>
-              <a:t>03.01.23</a:t>
+              <a:t>24.01.23</a:t>
             </a:fld>
             <a:endParaRPr lang="en-US" dirty="0"/>
           </a:p>
@@ -4829,7 +4829,7 @@
             <a:fld id="{6D8C46FE-6D60-7E43-9EAD-3064B98E9FE4}" type="datetime3">
               <a:rPr lang="es-ES_tradnl" smtClean="0"/>
               <a:pPr/>
-              <a:t>03.01.23</a:t>
+              <a:t>24.01.23</a:t>
             </a:fld>
             <a:endParaRPr lang="en-US" dirty="0"/>
           </a:p>
@@ -5145,7 +5145,7 @@
             <a:fld id="{03BAEA45-06BF-1B4B-8B5F-15A64A07D060}" type="datetime3">
               <a:rPr lang="es-ES_tradnl" smtClean="0"/>
               <a:pPr/>
-              <a:t>03.01.23</a:t>
+              <a:t>24.01.23</a:t>
             </a:fld>
             <a:endParaRPr lang="en-US" dirty="0"/>
           </a:p>
@@ -5344,7 +5344,7 @@
             <a:fld id="{03BAEA45-06BF-1B4B-8B5F-15A64A07D060}" type="datetime3">
               <a:rPr lang="es-ES_tradnl" smtClean="0"/>
               <a:pPr/>
-              <a:t>03.01.23</a:t>
+              <a:t>24.01.23</a:t>
             </a:fld>
             <a:endParaRPr lang="en-US" dirty="0"/>
           </a:p>
@@ -5543,7 +5543,7 @@
             <a:fld id="{03BAEA45-06BF-1B4B-8B5F-15A64A07D060}" type="datetime3">
               <a:rPr lang="es-ES_tradnl" smtClean="0"/>
               <a:pPr/>
-              <a:t>03.01.23</a:t>
+              <a:t>24.01.23</a:t>
             </a:fld>
             <a:endParaRPr lang="en-US" dirty="0"/>
           </a:p>
@@ -9133,7 +9133,7 @@
             <a:fld id="{2D72A43D-7419-4C41-A920-C6E38643746D}" type="datetime3">
               <a:rPr lang="es-ES_tradnl" smtClean="0"/>
               <a:pPr/>
-              <a:t>03.01.23</a:t>
+              <a:t>24.01.23</a:t>
             </a:fld>
             <a:endParaRPr lang="en-US" dirty="0"/>
           </a:p>
@@ -9414,7 +9414,7 @@
           <a:p>
             <a:fld id="{9FAE4B82-6DFA-A543-B435-4398A9590E55}" type="datetime3">
               <a:rPr lang="es-ES_tradnl" smtClean="0"/>
-              <a:t>03.01.23</a:t>
+              <a:t>24.01.23</a:t>
             </a:fld>
             <a:endParaRPr lang="en-US" dirty="0"/>
           </a:p>
@@ -10040,7 +10040,7 @@
             <a:fld id="{2D72A43D-7419-4C41-A920-C6E38643746D}" type="datetime3">
               <a:rPr lang="es-ES_tradnl" smtClean="0"/>
               <a:pPr/>
-              <a:t>03.01.23</a:t>
+              <a:t>24.01.23</a:t>
             </a:fld>
             <a:endParaRPr lang="en-US" dirty="0"/>
           </a:p>
@@ -10802,7 +10802,7 @@
             <a:fld id="{2D72A43D-7419-4C41-A920-C6E38643746D}" type="datetime3">
               <a:rPr lang="es-ES_tradnl" smtClean="0"/>
               <a:pPr/>
-              <a:t>03.01.23</a:t>
+              <a:t>24.01.23</a:t>
             </a:fld>
             <a:endParaRPr lang="en-US" dirty="0"/>
           </a:p>
@@ -11416,7 +11416,7 @@
             <a:fld id="{2D72A43D-7419-4C41-A920-C6E38643746D}" type="datetime3">
               <a:rPr lang="es-ES_tradnl" smtClean="0"/>
               <a:pPr/>
-              <a:t>03.01.23</a:t>
+              <a:t>24.01.23</a:t>
             </a:fld>
             <a:endParaRPr lang="en-US" dirty="0"/>
           </a:p>
@@ -12041,7 +12041,7 @@
             <a:fld id="{2D72A43D-7419-4C41-A920-C6E38643746D}" type="datetime3">
               <a:rPr lang="es-ES_tradnl" smtClean="0"/>
               <a:pPr/>
-              <a:t>03.01.23</a:t>
+              <a:t>24.01.23</a:t>
             </a:fld>
             <a:endParaRPr lang="en-US" dirty="0"/>
           </a:p>
@@ -12388,7 +12388,7 @@
             <a:fld id="{2D72A43D-7419-4C41-A920-C6E38643746D}" type="datetime3">
               <a:rPr lang="es-ES_tradnl" smtClean="0"/>
               <a:pPr/>
-              <a:t>03.01.23</a:t>
+              <a:t>24.01.23</a:t>
             </a:fld>
             <a:endParaRPr lang="en-US" dirty="0"/>
           </a:p>
@@ -12485,6 +12485,49 @@
                 </a:solidFill>
                 <a:latin typeface="Arial Nova Light" panose="020B0304020202020204" pitchFamily="34" charset="0"/>
               </a:rPr>
+              <a:t>This exercise is available on </a:t>
+            </a:r>
+            <a:r>
+              <a:rPr lang="en-US" dirty="0" err="1">
+                <a:solidFill>
+                  <a:schemeClr val="tx1"/>
+                </a:solidFill>
+                <a:latin typeface="Arial Nova Light" panose="020B0304020202020204" pitchFamily="34" charset="0"/>
+              </a:rPr>
+              <a:t>Mudle</a:t>
+            </a:r>
+            <a:r>
+              <a:rPr lang="en-US" dirty="0">
+                <a:solidFill>
+                  <a:schemeClr val="tx1"/>
+                </a:solidFill>
+                <a:latin typeface="Arial Nova Light" panose="020B0304020202020204" pitchFamily="34" charset="0"/>
+              </a:rPr>
+              <a:t> and GitHub.</a:t>
+            </a:r>
+          </a:p>
+          <a:p>
+            <a:pPr marL="0" indent="0">
+              <a:buNone/>
+            </a:pPr>
+            <a:endParaRPr lang="en-US" dirty="0">
+              <a:solidFill>
+                <a:schemeClr val="tx1"/>
+              </a:solidFill>
+              <a:latin typeface="Arial Nova Light" panose="020B0304020202020204" pitchFamily="34" charset="0"/>
+            </a:endParaRPr>
+          </a:p>
+          <a:p>
+            <a:pPr marL="0" indent="0">
+              <a:buNone/>
+            </a:pPr>
+            <a:r>
+              <a:rPr lang="en-US" dirty="0">
+                <a:solidFill>
+                  <a:schemeClr val="tx1"/>
+                </a:solidFill>
+                <a:latin typeface="Arial Nova Light" panose="020B0304020202020204" pitchFamily="34" charset="0"/>
+              </a:rPr>
               <a:t>Tasks:</a:t>
             </a:r>
           </a:p>
@@ -12500,7 +12543,7 @@
                 </a:solidFill>
                 <a:latin typeface="Arial Nova Light" panose="020B0304020202020204" pitchFamily="34" charset="0"/>
               </a:rPr>
-              <a:t>Download customer requirements from </a:t>
+              <a:t>Download motor customer requirements </a:t>
             </a:r>
             <a:r>
               <a:rPr lang="en-US" dirty="0" err="1">
@@ -12509,7 +12552,7 @@
                 </a:solidFill>
                 <a:latin typeface="Arial Nova Light" panose="020B0304020202020204" pitchFamily="34" charset="0"/>
               </a:rPr>
-              <a:t>Mudle</a:t>
+              <a:t>slx</a:t>
             </a:r>
             <a:r>
               <a:rPr lang="en-US" dirty="0">
@@ -12698,7 +12741,7 @@
           <a:p>
             <a:r>
               <a:rPr lang="es-ES" dirty="0" err="1"/>
-              <a:t>Example</a:t>
+              <a:t>Exercise</a:t>
             </a:r>
             <a:r>
               <a:rPr lang="es-ES" dirty="0"/>
@@ -12766,7 +12809,7 @@
             <a:fld id="{2D72A43D-7419-4C41-A920-C6E38643746D}" type="datetime3">
               <a:rPr lang="es-ES_tradnl" smtClean="0"/>
               <a:pPr/>
-              <a:t>03.01.23</a:t>
+              <a:t>24.01.23</a:t>
             </a:fld>
             <a:endParaRPr lang="en-US" dirty="0"/>
           </a:p>
@@ -13109,7 +13152,7 @@
             <a:fld id="{2D72A43D-7419-4C41-A920-C6E38643746D}" type="datetime3">
               <a:rPr lang="es-ES_tradnl" smtClean="0"/>
               <a:pPr/>
-              <a:t>03.01.23</a:t>
+              <a:t>24.01.23</a:t>
             </a:fld>
             <a:endParaRPr lang="en-US" dirty="0"/>
           </a:p>
@@ -13696,7 +13739,7 @@
             <a:fld id="{2D72A43D-7419-4C41-A920-C6E38643746D}" type="datetime3">
               <a:rPr lang="es-ES_tradnl" smtClean="0"/>
               <a:pPr/>
-              <a:t>03.01.23</a:t>
+              <a:t>24.01.23</a:t>
             </a:fld>
             <a:endParaRPr lang="en-US" dirty="0"/>
           </a:p>
@@ -14258,7 +14301,7 @@
             <a:fld id="{2D72A43D-7419-4C41-A920-C6E38643746D}" type="datetime3">
               <a:rPr lang="es-ES_tradnl" smtClean="0"/>
               <a:pPr/>
-              <a:t>03.01.23</a:t>
+              <a:t>24.01.23</a:t>
             </a:fld>
             <a:endParaRPr lang="en-US" dirty="0"/>
           </a:p>
@@ -14498,7 +14541,7 @@
             <a:fld id="{2D72A43D-7419-4C41-A920-C6E38643746D}" type="datetime3">
               <a:rPr lang="es-ES_tradnl" smtClean="0"/>
               <a:pPr/>
-              <a:t>03.01.23</a:t>
+              <a:t>24.01.23</a:t>
             </a:fld>
             <a:endParaRPr lang="en-US" dirty="0"/>
           </a:p>
@@ -14999,7 +15042,7 @@
             <a:fld id="{2D72A43D-7419-4C41-A920-C6E38643746D}" type="datetime3">
               <a:rPr lang="es-ES_tradnl" smtClean="0"/>
               <a:pPr/>
-              <a:t>03.01.23</a:t>
+              <a:t>24.01.23</a:t>
             </a:fld>
             <a:endParaRPr lang="en-US" dirty="0"/>
           </a:p>
@@ -15243,7 +15286,7 @@
             <a:fld id="{2D72A43D-7419-4C41-A920-C6E38643746D}" type="datetime3">
               <a:rPr lang="es-ES_tradnl" smtClean="0"/>
               <a:pPr/>
-              <a:t>03.01.23</a:t>
+              <a:t>24.01.23</a:t>
             </a:fld>
             <a:endParaRPr lang="en-US" dirty="0"/>
           </a:p>
@@ -15683,7 +15726,7 @@
             <a:fld id="{2D72A43D-7419-4C41-A920-C6E38643746D}" type="datetime3">
               <a:rPr lang="es-ES_tradnl" smtClean="0"/>
               <a:pPr/>
-              <a:t>03.01.23</a:t>
+              <a:t>24.01.23</a:t>
             </a:fld>
             <a:endParaRPr lang="en-US" dirty="0"/>
           </a:p>
@@ -16211,7 +16254,7 @@
             <a:fld id="{2D72A43D-7419-4C41-A920-C6E38643746D}" type="datetime3">
               <a:rPr lang="es-ES_tradnl" smtClean="0"/>
               <a:pPr/>
-              <a:t>03.01.23</a:t>
+              <a:t>24.01.23</a:t>
             </a:fld>
             <a:endParaRPr lang="en-US" dirty="0"/>
           </a:p>
@@ -16340,7 +16383,7 @@
             <a:fld id="{2D72A43D-7419-4C41-A920-C6E38643746D}" type="datetime3">
               <a:rPr lang="es-ES_tradnl" smtClean="0"/>
               <a:pPr/>
-              <a:t>03.01.23</a:t>
+              <a:t>24.01.23</a:t>
             </a:fld>
             <a:endParaRPr lang="en-US" dirty="0"/>
           </a:p>
@@ -17488,7 +17531,7 @@
             <a:fld id="{2D72A43D-7419-4C41-A920-C6E38643746D}" type="datetime3">
               <a:rPr lang="es-ES_tradnl" smtClean="0"/>
               <a:pPr/>
-              <a:t>03.01.23</a:t>
+              <a:t>24.01.23</a:t>
             </a:fld>
             <a:endParaRPr lang="en-US" dirty="0"/>
           </a:p>
@@ -18069,7 +18112,7 @@
             <a:fld id="{2D72A43D-7419-4C41-A920-C6E38643746D}" type="datetime3">
               <a:rPr lang="es-ES_tradnl" smtClean="0"/>
               <a:pPr/>
-              <a:t>03.01.23</a:t>
+              <a:t>24.01.23</a:t>
             </a:fld>
             <a:endParaRPr lang="en-US" dirty="0"/>
           </a:p>
@@ -18492,7 +18535,7 @@
             <a:fld id="{2D72A43D-7419-4C41-A920-C6E38643746D}" type="datetime3">
               <a:rPr lang="es-ES_tradnl" smtClean="0"/>
               <a:pPr/>
-              <a:t>03.01.23</a:t>
+              <a:t>24.01.23</a:t>
             </a:fld>
             <a:endParaRPr lang="en-US" dirty="0"/>
           </a:p>
@@ -18904,7 +18947,7 @@
             <a:fld id="{2D72A43D-7419-4C41-A920-C6E38643746D}" type="datetime3">
               <a:rPr lang="es-ES_tradnl" smtClean="0"/>
               <a:pPr/>
-              <a:t>03.01.23</a:t>
+              <a:t>24.01.23</a:t>
             </a:fld>
             <a:endParaRPr lang="en-US" dirty="0"/>
           </a:p>
@@ -19406,7 +19449,7 @@
             <a:fld id="{2D72A43D-7419-4C41-A920-C6E38643746D}" type="datetime3">
               <a:rPr lang="es-ES_tradnl" smtClean="0"/>
               <a:pPr/>
-              <a:t>03.01.23</a:t>
+              <a:t>24.01.23</a:t>
             </a:fld>
             <a:endParaRPr lang="en-US" dirty="0"/>
           </a:p>
@@ -20197,7 +20240,7 @@
             <a:fld id="{2D72A43D-7419-4C41-A920-C6E38643746D}" type="datetime3">
               <a:rPr lang="es-ES_tradnl" smtClean="0"/>
               <a:pPr/>
-              <a:t>03.01.23</a:t>
+              <a:t>24.01.23</a:t>
             </a:fld>
             <a:endParaRPr lang="en-US" dirty="0"/>
           </a:p>
@@ -20413,7 +20456,7 @@
             <a:fld id="{2D72A43D-7419-4C41-A920-C6E38643746D}" type="datetime3">
               <a:rPr lang="es-ES_tradnl" smtClean="0"/>
               <a:pPr/>
-              <a:t>03.01.23</a:t>
+              <a:t>24.01.23</a:t>
             </a:fld>
             <a:endParaRPr lang="en-US" dirty="0"/>
           </a:p>
@@ -20542,7 +20585,7 @@
             <a:fld id="{2D72A43D-7419-4C41-A920-C6E38643746D}" type="datetime3">
               <a:rPr lang="es-ES_tradnl" smtClean="0"/>
               <a:pPr/>
-              <a:t>03.01.23</a:t>
+              <a:t>24.01.23</a:t>
             </a:fld>
             <a:endParaRPr lang="en-US" dirty="0"/>
           </a:p>
@@ -21217,7 +21260,7 @@
             <a:fld id="{2D72A43D-7419-4C41-A920-C6E38643746D}" type="datetime3">
               <a:rPr lang="es-ES_tradnl" smtClean="0"/>
               <a:pPr/>
-              <a:t>03.01.23</a:t>
+              <a:t>24.01.23</a:t>
             </a:fld>
             <a:endParaRPr lang="en-US" dirty="0"/>
           </a:p>
@@ -21807,7 +21850,7 @@
             <a:fld id="{2D72A43D-7419-4C41-A920-C6E38643746D}" type="datetime3">
               <a:rPr lang="es-ES_tradnl" smtClean="0"/>
               <a:pPr/>
-              <a:t>03.01.23</a:t>
+              <a:t>24.01.23</a:t>
             </a:fld>
             <a:endParaRPr lang="en-US" dirty="0"/>
           </a:p>
@@ -22373,7 +22416,7 @@
             <a:fld id="{2D72A43D-7419-4C41-A920-C6E38643746D}" type="datetime3">
               <a:rPr lang="es-ES_tradnl" smtClean="0"/>
               <a:pPr/>
-              <a:t>03.01.23</a:t>
+              <a:t>24.01.23</a:t>
             </a:fld>
             <a:endParaRPr lang="en-US" dirty="0"/>
           </a:p>
@@ -22934,7 +22977,7 @@
             <a:fld id="{2D72A43D-7419-4C41-A920-C6E38643746D}" type="datetime3">
               <a:rPr lang="es-ES_tradnl" smtClean="0"/>
               <a:pPr/>
-              <a:t>03.01.23</a:t>
+              <a:t>24.01.23</a:t>
             </a:fld>
             <a:endParaRPr lang="en-US" dirty="0"/>
           </a:p>
@@ -24012,7 +24055,7 @@
             <a:fld id="{2D72A43D-7419-4C41-A920-C6E38643746D}" type="datetime3">
               <a:rPr lang="es-ES_tradnl" smtClean="0"/>
               <a:pPr/>
-              <a:t>03.01.23</a:t>
+              <a:t>24.01.23</a:t>
             </a:fld>
             <a:endParaRPr lang="en-US" dirty="0"/>
           </a:p>
@@ -24285,7 +24328,7 @@
             <a:fld id="{2D72A43D-7419-4C41-A920-C6E38643746D}" type="datetime3">
               <a:rPr lang="es-ES_tradnl" smtClean="0"/>
               <a:pPr/>
-              <a:t>03.01.23</a:t>
+              <a:t>24.01.23</a:t>
             </a:fld>
             <a:endParaRPr lang="en-US" dirty="0"/>
           </a:p>
@@ -24705,7 +24748,7 @@
             <a:fld id="{2D72A43D-7419-4C41-A920-C6E38643746D}" type="datetime3">
               <a:rPr lang="es-ES_tradnl" smtClean="0"/>
               <a:pPr/>
-              <a:t>03.01.23</a:t>
+              <a:t>24.01.23</a:t>
             </a:fld>
             <a:endParaRPr lang="en-US" dirty="0"/>
           </a:p>
@@ -25315,7 +25358,7 @@
             <a:fld id="{2D72A43D-7419-4C41-A920-C6E38643746D}" type="datetime3">
               <a:rPr lang="es-ES_tradnl" smtClean="0"/>
               <a:pPr/>
-              <a:t>03.01.23</a:t>
+              <a:t>24.01.23</a:t>
             </a:fld>
             <a:endParaRPr lang="en-US" dirty="0"/>
           </a:p>
@@ -25444,7 +25487,7 @@
             <a:fld id="{2D72A43D-7419-4C41-A920-C6E38643746D}" type="datetime3">
               <a:rPr lang="es-ES_tradnl" smtClean="0"/>
               <a:pPr/>
-              <a:t>03.01.23</a:t>
+              <a:t>24.01.23</a:t>
             </a:fld>
             <a:endParaRPr lang="en-US" dirty="0"/>
           </a:p>
@@ -25808,7 +25851,7 @@
             <a:fld id="{2D72A43D-7419-4C41-A920-C6E38643746D}" type="datetime3">
               <a:rPr lang="es-ES_tradnl" smtClean="0"/>
               <a:pPr/>
-              <a:t>03.01.23</a:t>
+              <a:t>24.01.23</a:t>
             </a:fld>
             <a:endParaRPr lang="en-US" dirty="0"/>
           </a:p>

</xml_diff>